<commit_message>
Revisão das aulas do primeiro semestre e preparação das aulas do segundo
</commit_message>
<xml_diff>
--- a/1º Semestre/Aula 00 - Aula Magna e Orientações/Aula 00 - Aula Magna e Orientações v2.pptx
+++ b/1º Semestre/Aula 00 - Aula Magna e Orientações/Aula 00 - Aula Magna e Orientações v2.pptx
@@ -223,7 +223,7 @@
             <a:fld id="{4EA5E1ED-E65E-440E-8A4B-5F5DC973F797}" type="datetimeFigureOut">
               <a:rPr lang="pt-BR" smtClean="0"/>
               <a:pPr/>
-              <a:t>26/07/2023</a:t>
+              <a:t>27/08/2023</a:t>
             </a:fld>
             <a:endParaRPr lang="pt-BR"/>
           </a:p>
@@ -640,7 +640,7 @@
           <a:p>
             <a:fld id="{1787AD07-0C2A-424C-83EF-FCCF4A0D3BA0}" type="datetime1">
               <a:rPr lang="pt-BR" smtClean="0"/>
-              <a:t>26/07/2023</a:t>
+              <a:t>27/08/2023</a:t>
             </a:fld>
             <a:endParaRPr lang="pt-BR"/>
           </a:p>
@@ -809,7 +809,7 @@
           <a:p>
             <a:fld id="{2F92FB66-59C8-46A5-AD82-5DAAFD2DC390}" type="datetime1">
               <a:rPr lang="pt-BR" smtClean="0"/>
-              <a:t>26/07/2023</a:t>
+              <a:t>27/08/2023</a:t>
             </a:fld>
             <a:endParaRPr lang="pt-BR"/>
           </a:p>
@@ -988,7 +988,7 @@
           <a:p>
             <a:fld id="{3D5CC8D2-C61E-4471-AD68-1C0D45A8EAFC}" type="datetime1">
               <a:rPr lang="pt-BR" smtClean="0"/>
-              <a:t>26/07/2023</a:t>
+              <a:t>27/08/2023</a:t>
             </a:fld>
             <a:endParaRPr lang="pt-BR"/>
           </a:p>
@@ -1131,7 +1131,7 @@
           <a:p>
             <a:fld id="{C3E38981-C08A-4A29-B885-392FB4EE0709}" type="datetime1">
               <a:rPr lang="pt-BR" smtClean="0"/>
-              <a:t>26/07/2023</a:t>
+              <a:t>27/08/2023</a:t>
             </a:fld>
             <a:endParaRPr lang="en-US" dirty="0"/>
           </a:p>
@@ -1516,7 +1516,7 @@
           <a:p>
             <a:fld id="{2CFE63D7-5B4A-40A4-8FD4-EA63D1010EB7}" type="datetime1">
               <a:rPr lang="pt-BR" smtClean="0"/>
-              <a:t>26/07/2023</a:t>
+              <a:t>27/08/2023</a:t>
             </a:fld>
             <a:endParaRPr lang="en-US" dirty="0"/>
           </a:p>
@@ -1738,7 +1738,7 @@
           <a:p>
             <a:fld id="{A9719147-5557-4D76-A2C3-BF25882771D2}" type="datetime1">
               <a:rPr lang="pt-BR" smtClean="0"/>
-              <a:t>26/07/2023</a:t>
+              <a:t>27/08/2023</a:t>
             </a:fld>
             <a:endParaRPr lang="en-US" dirty="0"/>
           </a:p>
@@ -2051,7 +2051,7 @@
           <a:p>
             <a:fld id="{66250340-7104-44A8-88A9-88532CCE9C1C}" type="datetime1">
               <a:rPr lang="pt-BR" smtClean="0"/>
-              <a:t>26/07/2023</a:t>
+              <a:t>27/08/2023</a:t>
             </a:fld>
             <a:endParaRPr lang="en-US" dirty="0"/>
           </a:p>
@@ -2236,7 +2236,7 @@
           <a:p>
             <a:fld id="{D047EA32-7810-48BE-A9BB-EA3D8AA5AD34}" type="datetime1">
               <a:rPr lang="pt-BR" smtClean="0"/>
-              <a:t>26/07/2023</a:t>
+              <a:t>27/08/2023</a:t>
             </a:fld>
             <a:endParaRPr lang="en-US" dirty="0"/>
           </a:p>
@@ -2384,7 +2384,7 @@
           <a:p>
             <a:fld id="{7C28E9E9-B91F-400E-BE43-87BB4B5C6F4E}" type="datetime1">
               <a:rPr lang="pt-BR" smtClean="0"/>
-              <a:t>26/07/2023</a:t>
+              <a:t>27/08/2023</a:t>
             </a:fld>
             <a:endParaRPr lang="en-US" dirty="0"/>
           </a:p>
@@ -2636,7 +2636,7 @@
           <a:p>
             <a:fld id="{A9E773EA-BFD5-41D4-8CCD-2C9F67DAB481}" type="datetime1">
               <a:rPr lang="pt-BR" smtClean="0"/>
-              <a:t>26/07/2023</a:t>
+              <a:t>27/08/2023</a:t>
             </a:fld>
             <a:endParaRPr lang="pt-BR" dirty="0"/>
           </a:p>
@@ -2838,7 +2838,7 @@
           <a:p>
             <a:fld id="{DAA7C8B6-CF57-4A95-AF6C-A77E6C230ED3}" type="datetime1">
               <a:rPr lang="pt-BR" smtClean="0"/>
-              <a:t>26/07/2023</a:t>
+              <a:t>27/08/2023</a:t>
             </a:fld>
             <a:endParaRPr lang="pt-BR"/>
           </a:p>
@@ -3122,7 +3122,7 @@
           <a:p>
             <a:fld id="{34D50989-24C8-4023-9B0D-A6D249548FD9}" type="datetime1">
               <a:rPr lang="pt-BR" smtClean="0"/>
-              <a:t>26/07/2023</a:t>
+              <a:t>27/08/2023</a:t>
             </a:fld>
             <a:endParaRPr lang="pt-BR"/>
           </a:p>
@@ -3358,7 +3358,7 @@
           <a:p>
             <a:fld id="{8D9BC96A-9776-4585-A439-BC9E2DA226C1}" type="datetime1">
               <a:rPr lang="pt-BR" smtClean="0"/>
-              <a:t>26/07/2023</a:t>
+              <a:t>27/08/2023</a:t>
             </a:fld>
             <a:endParaRPr lang="pt-BR"/>
           </a:p>
@@ -3741,7 +3741,7 @@
           <a:p>
             <a:fld id="{7D12BE36-2922-4567-BD67-201EFA21BF6D}" type="datetime1">
               <a:rPr lang="pt-BR" smtClean="0"/>
-              <a:t>26/07/2023</a:t>
+              <a:t>27/08/2023</a:t>
             </a:fld>
             <a:endParaRPr lang="pt-BR"/>
           </a:p>
@@ -3853,7 +3853,7 @@
           <a:p>
             <a:fld id="{E5B462A9-4B1E-4013-BFB1-FC92225AC2F2}" type="datetime1">
               <a:rPr lang="pt-BR" smtClean="0"/>
-              <a:t>26/07/2023</a:t>
+              <a:t>27/08/2023</a:t>
             </a:fld>
             <a:endParaRPr lang="pt-BR"/>
           </a:p>
@@ -3937,7 +3937,7 @@
           <a:p>
             <a:fld id="{D0E6EC7A-67E7-4978-9BAE-C8F82A40B13B}" type="datetime1">
               <a:rPr lang="pt-BR" smtClean="0"/>
-              <a:t>26/07/2023</a:t>
+              <a:t>27/08/2023</a:t>
             </a:fld>
             <a:endParaRPr lang="pt-BR"/>
           </a:p>
@@ -4219,7 +4219,7 @@
           <a:p>
             <a:fld id="{6E085A4E-80B8-47DD-9D9B-8E1B205CBB30}" type="datetime1">
               <a:rPr lang="pt-BR" smtClean="0"/>
-              <a:t>26/07/2023</a:t>
+              <a:t>27/08/2023</a:t>
             </a:fld>
             <a:endParaRPr lang="pt-BR"/>
           </a:p>
@@ -4478,7 +4478,7 @@
           <a:p>
             <a:fld id="{F4E9A02C-D9AD-4B8C-9B93-B0980E8E86EB}" type="datetime1">
               <a:rPr lang="pt-BR" smtClean="0"/>
-              <a:t>26/07/2023</a:t>
+              <a:t>27/08/2023</a:t>
             </a:fld>
             <a:endParaRPr lang="pt-BR"/>
           </a:p>
@@ -4690,7 +4690,7 @@
           <a:p>
             <a:fld id="{202762D0-3A59-4B14-83BA-8E0FC8A60AB1}" type="datetime1">
               <a:rPr lang="pt-BR" smtClean="0"/>
-              <a:t>26/07/2023</a:t>
+              <a:t>27/08/2023</a:t>
             </a:fld>
             <a:endParaRPr lang="pt-BR"/>
           </a:p>
@@ -7076,14 +7076,14 @@
           <p:nvPr>
             <p:extLst>
               <p:ext uri="{D42A27DB-BD31-4B8C-83A1-F6EECF244321}">
-                <p14:modId xmlns:p14="http://schemas.microsoft.com/office/powerpoint/2010/main" val="3389887994"/>
+                <p14:modId xmlns:p14="http://schemas.microsoft.com/office/powerpoint/2010/main" val="2110600779"/>
               </p:ext>
             </p:extLst>
           </p:nvPr>
         </p:nvGraphicFramePr>
         <p:xfrm>
           <a:off x="323528" y="1089371"/>
-          <a:ext cx="8234893" cy="5036090"/>
+          <a:ext cx="8234893" cy="5068255"/>
         </p:xfrm>
         <a:graphic>
           <a:graphicData uri="http://schemas.openxmlformats.org/drawingml/2006/table">
@@ -7236,7 +7236,7 @@
                         <a:rPr lang="pt-BR" sz="900" dirty="0">
                           <a:latin typeface="Gotham HTF"/>
                         </a:rPr>
-                        <a:t>Semana 1</a:t>
+                        <a:t>21 e 23 de Agosto</a:t>
                       </a:r>
                     </a:p>
                   </a:txBody>
@@ -7255,11 +7255,28 @@
                       </a:r>
                     </a:p>
                     <a:p>
+                      <a:pPr marL="0" marR="0" lvl="0" indent="0" algn="l" defTabSz="914400" rtl="0" eaLnBrk="1" fontAlgn="auto" latinLnBrk="0" hangingPunct="1">
+                        <a:lnSpc>
+                          <a:spcPct val="100000"/>
+                        </a:lnSpc>
+                        <a:spcBef>
+                          <a:spcPts val="0"/>
+                        </a:spcBef>
+                        <a:spcAft>
+                          <a:spcPts val="0"/>
+                        </a:spcAft>
+                        <a:buClrTx/>
+                        <a:buSzTx/>
+                        <a:buFontTx/>
+                        <a:buNone/>
+                        <a:tabLst/>
+                        <a:defRPr/>
+                      </a:pPr>
                       <a:r>
                         <a:rPr lang="pt-BR" sz="900" dirty="0">
                           <a:latin typeface="Gotham HTF"/>
                         </a:rPr>
-                        <a:t>Aula 01 – Introdução a Computação</a:t>
+                        <a:t>Aula 02 – Sistemas de Numeração</a:t>
                       </a:r>
                     </a:p>
                   </a:txBody>
@@ -7270,9 +7287,20 @@
                     <a:bodyPr/>
                     <a:lstStyle/>
                     <a:p>
-                      <a:endParaRPr lang="pt-BR" sz="900" dirty="0">
-                        <a:latin typeface="Gotham HTF"/>
-                      </a:endParaRPr>
+                      <a:r>
+                        <a:rPr lang="pt-BR" sz="900" dirty="0">
+                          <a:latin typeface="Gotham HTF"/>
+                        </a:rPr>
+                        <a:t>OK</a:t>
+                      </a:r>
+                    </a:p>
+                    <a:p>
+                      <a:r>
+                        <a:rPr lang="pt-BR" sz="900" dirty="0">
+                          <a:latin typeface="Gotham HTF"/>
+                        </a:rPr>
+                        <a:t>Parcial OK</a:t>
+                      </a:r>
                     </a:p>
                   </a:txBody>
                   <a:tcPr/>
@@ -7311,7 +7339,7 @@
                         <a:rPr lang="pt-BR" sz="900" dirty="0">
                           <a:latin typeface="Gotham HTF"/>
                         </a:rPr>
-                        <a:t>Semana 2</a:t>
+                        <a:t>28 e 30 de Agosto</a:t>
                       </a:r>
                     </a:p>
                   </a:txBody>
@@ -7322,11 +7350,28 @@
                     <a:bodyPr/>
                     <a:lstStyle/>
                     <a:p>
+                      <a:pPr marL="0" marR="0" lvl="0" indent="0" algn="l" defTabSz="914400" rtl="0" eaLnBrk="1" fontAlgn="auto" latinLnBrk="0" hangingPunct="1">
+                        <a:lnSpc>
+                          <a:spcPct val="100000"/>
+                        </a:lnSpc>
+                        <a:spcBef>
+                          <a:spcPts val="0"/>
+                        </a:spcBef>
+                        <a:spcAft>
+                          <a:spcPts val="0"/>
+                        </a:spcAft>
+                        <a:buClrTx/>
+                        <a:buSzTx/>
+                        <a:buFontTx/>
+                        <a:buNone/>
+                        <a:tabLst/>
+                        <a:defRPr/>
+                      </a:pPr>
                       <a:r>
                         <a:rPr lang="pt-BR" sz="900" dirty="0">
                           <a:latin typeface="Gotham HTF"/>
                         </a:rPr>
-                        <a:t>Aula 02 – Sistemas de Numeração</a:t>
+                        <a:t>Aula 03 – Lógica de Programação</a:t>
                       </a:r>
                     </a:p>
                   </a:txBody>
@@ -7384,7 +7429,7 @@
                         <a:rPr lang="pt-BR" sz="900" dirty="0">
                           <a:latin typeface="Gotham HTF"/>
                         </a:rPr>
-                        <a:t>Semana 3</a:t>
+                        <a:t>04 e 06 de Setembro</a:t>
                       </a:r>
                     </a:p>
                   </a:txBody>
@@ -7395,11 +7440,28 @@
                     <a:bodyPr/>
                     <a:lstStyle/>
                     <a:p>
+                      <a:pPr marL="0" marR="0" lvl="0" indent="0" algn="l" defTabSz="914400" rtl="0" eaLnBrk="1" fontAlgn="auto" latinLnBrk="0" hangingPunct="1">
+                        <a:lnSpc>
+                          <a:spcPct val="100000"/>
+                        </a:lnSpc>
+                        <a:spcBef>
+                          <a:spcPts val="0"/>
+                        </a:spcBef>
+                        <a:spcAft>
+                          <a:spcPts val="0"/>
+                        </a:spcAft>
+                        <a:buClrTx/>
+                        <a:buSzTx/>
+                        <a:buFontTx/>
+                        <a:buNone/>
+                        <a:tabLst/>
+                        <a:defRPr/>
+                      </a:pPr>
                       <a:r>
                         <a:rPr lang="pt-BR" sz="900" dirty="0">
                           <a:latin typeface="Gotham HTF"/>
                         </a:rPr>
-                        <a:t>Aula 03 – Lógica de Programação</a:t>
+                        <a:t>Aula 04 – Tipos de Variáveis</a:t>
                       </a:r>
                     </a:p>
                   </a:txBody>
@@ -7471,7 +7533,7 @@
                         <a:rPr lang="pt-BR" sz="900" dirty="0">
                           <a:latin typeface="Gotham HTF"/>
                         </a:rPr>
-                        <a:t>Semana 4</a:t>
+                        <a:t>11 e 13 de Setembro</a:t>
                       </a:r>
                     </a:p>
                   </a:txBody>
@@ -7482,11 +7544,28 @@
                     <a:bodyPr/>
                     <a:lstStyle/>
                     <a:p>
+                      <a:pPr marL="0" marR="0" lvl="0" indent="0" algn="l" defTabSz="914400" rtl="0" eaLnBrk="1" fontAlgn="auto" latinLnBrk="0" hangingPunct="1">
+                        <a:lnSpc>
+                          <a:spcPct val="100000"/>
+                        </a:lnSpc>
+                        <a:spcBef>
+                          <a:spcPts val="0"/>
+                        </a:spcBef>
+                        <a:spcAft>
+                          <a:spcPts val="0"/>
+                        </a:spcAft>
+                        <a:buClrTx/>
+                        <a:buSzTx/>
+                        <a:buFontTx/>
+                        <a:buNone/>
+                        <a:tabLst/>
+                        <a:defRPr/>
+                      </a:pPr>
                       <a:r>
                         <a:rPr lang="pt-BR" sz="900" dirty="0">
                           <a:latin typeface="Gotham HTF"/>
                         </a:rPr>
-                        <a:t>Aula 04 – Tipos de Variáveis</a:t>
+                        <a:t>Aula 05 – Sinais Analógicos e Digitais</a:t>
                       </a:r>
                     </a:p>
                   </a:txBody>
@@ -7558,7 +7637,7 @@
                         <a:rPr lang="pt-BR" sz="900" dirty="0">
                           <a:latin typeface="Gotham HTF"/>
                         </a:rPr>
-                        <a:t>Semana 5</a:t>
+                        <a:t>18 e 20 de Setembro</a:t>
                       </a:r>
                     </a:p>
                   </a:txBody>
@@ -7590,7 +7669,7 @@
                         <a:rPr lang="pt-BR" sz="900" dirty="0">
                           <a:latin typeface="Gotham HTF"/>
                         </a:rPr>
-                        <a:t>Aula 05 – Sinais Analógicos e Digitais</a:t>
+                        <a:t>Aula 06 – Funções e Sensores de Ambiente</a:t>
                       </a:r>
                     </a:p>
                   </a:txBody>
@@ -7642,111 +7721,7 @@
                         <a:rPr lang="pt-BR" sz="900" dirty="0">
                           <a:latin typeface="Gotham HTF"/>
                         </a:rPr>
-                        <a:t>Semana 6</a:t>
-                      </a:r>
-                    </a:p>
-                  </a:txBody>
-                  <a:tcPr/>
-                </a:tc>
-                <a:tc>
-                  <a:txBody>
-                    <a:bodyPr/>
-                    <a:lstStyle/>
-                    <a:p>
-                      <a:pPr marL="0" marR="0" lvl="0" indent="0" algn="l" defTabSz="914400" rtl="0" eaLnBrk="1" fontAlgn="auto" latinLnBrk="0" hangingPunct="1">
-                        <a:lnSpc>
-                          <a:spcPct val="100000"/>
-                        </a:lnSpc>
-                        <a:spcBef>
-                          <a:spcPts val="0"/>
-                        </a:spcBef>
-                        <a:spcAft>
-                          <a:spcPts val="0"/>
-                        </a:spcAft>
-                        <a:buClrTx/>
-                        <a:buSzTx/>
-                        <a:buFontTx/>
-                        <a:buNone/>
-                        <a:tabLst/>
-                        <a:defRPr/>
-                      </a:pPr>
-                      <a:r>
-                        <a:rPr lang="pt-BR" sz="900" dirty="0">
-                          <a:latin typeface="Gotham HTF"/>
-                        </a:rPr>
-                        <a:t>Aula 06 – Funções e Sensores de Ambiente</a:t>
-                      </a:r>
-                    </a:p>
-                  </a:txBody>
-                  <a:tcPr/>
-                </a:tc>
-                <a:tc>
-                  <a:txBody>
-                    <a:bodyPr/>
-                    <a:lstStyle/>
-                    <a:p>
-                      <a:pPr marL="0" marR="0" lvl="0" indent="0" algn="l" defTabSz="914400" rtl="0" eaLnBrk="1" fontAlgn="auto" latinLnBrk="0" hangingPunct="1">
-                        <a:lnSpc>
-                          <a:spcPct val="100000"/>
-                        </a:lnSpc>
-                        <a:spcBef>
-                          <a:spcPts val="0"/>
-                        </a:spcBef>
-                        <a:spcAft>
-                          <a:spcPts val="0"/>
-                        </a:spcAft>
-                        <a:buClrTx/>
-                        <a:buSzTx/>
-                        <a:buFontTx/>
-                        <a:buNone/>
-                        <a:tabLst/>
-                        <a:defRPr/>
-                      </a:pPr>
-                      <a:endParaRPr lang="pt-BR" sz="900" dirty="0">
-                        <a:solidFill>
-                          <a:srgbClr val="FF0000"/>
-                        </a:solidFill>
-                        <a:latin typeface="Gotham HTF"/>
-                      </a:endParaRPr>
-                    </a:p>
-                  </a:txBody>
-                  <a:tcPr/>
-                </a:tc>
-                <a:extLst>
-                  <a:ext uri="{0D108BD9-81ED-4DB2-BD59-A6C34878D82A}">
-                    <a16:rowId xmlns:a16="http://schemas.microsoft.com/office/drawing/2014/main" val="1187898213"/>
-                  </a:ext>
-                </a:extLst>
-              </a:tr>
-              <a:tr h="333595">
-                <a:tc>
-                  <a:txBody>
-                    <a:bodyPr/>
-                    <a:lstStyle/>
-                    <a:p>
-                      <a:r>
-                        <a:rPr lang="pt-BR" sz="900" dirty="0">
-                          <a:solidFill>
-                            <a:schemeClr val="tx1"/>
-                          </a:solidFill>
-                          <a:latin typeface="Gotham HTF"/>
-                        </a:rPr>
-                        <a:t>07</a:t>
-                      </a:r>
-                    </a:p>
-                  </a:txBody>
-                  <a:tcPr/>
-                </a:tc>
-                <a:tc>
-                  <a:txBody>
-                    <a:bodyPr/>
-                    <a:lstStyle/>
-                    <a:p>
-                      <a:r>
-                        <a:rPr lang="pt-BR" sz="900" dirty="0">
-                          <a:latin typeface="Gotham HTF"/>
-                        </a:rPr>
-                        <a:t>Semana 7</a:t>
+                        <a:t>25 e 27 de Setembro</a:t>
                       </a:r>
                     </a:p>
                   </a:txBody>
@@ -7821,6 +7796,113 @@
                 </a:tc>
                 <a:extLst>
                   <a:ext uri="{0D108BD9-81ED-4DB2-BD59-A6C34878D82A}">
+                    <a16:rowId xmlns:a16="http://schemas.microsoft.com/office/drawing/2014/main" val="1187898213"/>
+                  </a:ext>
+                </a:extLst>
+              </a:tr>
+              <a:tr h="333595">
+                <a:tc>
+                  <a:txBody>
+                    <a:bodyPr/>
+                    <a:lstStyle/>
+                    <a:p>
+                      <a:r>
+                        <a:rPr lang="pt-BR" sz="900" dirty="0">
+                          <a:solidFill>
+                            <a:schemeClr val="tx1"/>
+                          </a:solidFill>
+                          <a:latin typeface="Gotham HTF"/>
+                        </a:rPr>
+                        <a:t>07</a:t>
+                      </a:r>
+                    </a:p>
+                  </a:txBody>
+                  <a:tcPr/>
+                </a:tc>
+                <a:tc>
+                  <a:txBody>
+                    <a:bodyPr/>
+                    <a:lstStyle/>
+                    <a:p>
+                      <a:r>
+                        <a:rPr lang="pt-BR" sz="900" dirty="0">
+                          <a:latin typeface="Gotham HTF"/>
+                        </a:rPr>
+                        <a:t>02 e 04 de Outubro</a:t>
+                      </a:r>
+                    </a:p>
+                  </a:txBody>
+                  <a:tcPr/>
+                </a:tc>
+                <a:tc>
+                  <a:txBody>
+                    <a:bodyPr/>
+                    <a:lstStyle/>
+                    <a:p>
+                      <a:pPr marL="0" marR="0" lvl="0" indent="0" algn="l" defTabSz="914400" rtl="0" eaLnBrk="1" fontAlgn="auto" latinLnBrk="0" hangingPunct="1">
+                        <a:lnSpc>
+                          <a:spcPct val="100000"/>
+                        </a:lnSpc>
+                        <a:spcBef>
+                          <a:spcPts val="0"/>
+                        </a:spcBef>
+                        <a:spcAft>
+                          <a:spcPts val="0"/>
+                        </a:spcAft>
+                        <a:buClrTx/>
+                        <a:buSzTx/>
+                        <a:buFontTx/>
+                        <a:buNone/>
+                        <a:tabLst/>
+                        <a:defRPr/>
+                      </a:pPr>
+                      <a:r>
+                        <a:rPr lang="pt-BR" sz="900" dirty="0">
+                          <a:latin typeface="Gotham HTF"/>
+                        </a:rPr>
+                        <a:t>Aula 07 – Atuadores </a:t>
+                      </a:r>
+                    </a:p>
+                  </a:txBody>
+                  <a:tcPr/>
+                </a:tc>
+                <a:tc>
+                  <a:txBody>
+                    <a:bodyPr/>
+                    <a:lstStyle/>
+                    <a:p>
+                      <a:pPr marL="0" marR="0" lvl="0" indent="0" algn="l" defTabSz="914400" rtl="0" eaLnBrk="1" fontAlgn="auto" latinLnBrk="0" hangingPunct="1">
+                        <a:lnSpc>
+                          <a:spcPct val="100000"/>
+                        </a:lnSpc>
+                        <a:spcBef>
+                          <a:spcPts val="0"/>
+                        </a:spcBef>
+                        <a:spcAft>
+                          <a:spcPts val="0"/>
+                        </a:spcAft>
+                        <a:buClrTx/>
+                        <a:buSzTx/>
+                        <a:buFontTx/>
+                        <a:buNone/>
+                        <a:tabLst/>
+                        <a:defRPr/>
+                      </a:pPr>
+                      <a:r>
+                        <a:rPr lang="pt-BR" sz="900" dirty="0">
+                          <a:solidFill>
+                            <a:srgbClr val="FF0000"/>
+                          </a:solidFill>
+                          <a:latin typeface="Gotham HTF"/>
+                        </a:rPr>
+                        <a:t>Divulgação do CP2</a:t>
+                      </a:r>
+                    </a:p>
+                  </a:txBody>
+                  <a:tcPr/>
+                </a:tc>
+                <a:extLst>
+                  <a:ext uri="{0D108BD9-81ED-4DB2-BD59-A6C34878D82A}">
                     <a16:rowId xmlns:a16="http://schemas.microsoft.com/office/drawing/2014/main" val="2658113184"/>
                   </a:ext>
                 </a:extLst>
@@ -7853,83 +7935,7 @@
                         <a:rPr lang="pt-BR" sz="900" dirty="0">
                           <a:latin typeface="Gotham HTF"/>
                         </a:rPr>
-                        <a:t>Semana 8</a:t>
-                      </a:r>
-                    </a:p>
-                  </a:txBody>
-                  <a:tcPr/>
-                </a:tc>
-                <a:tc>
-                  <a:txBody>
-                    <a:bodyPr/>
-                    <a:lstStyle/>
-                    <a:p>
-                      <a:r>
-                        <a:rPr lang="pt-BR" sz="900" dirty="0">
-                          <a:latin typeface="Gotham HTF"/>
-                        </a:rPr>
-                        <a:t>Aula 07 – Atuadores </a:t>
-                      </a:r>
-                    </a:p>
-                  </a:txBody>
-                  <a:tcPr/>
-                </a:tc>
-                <a:tc>
-                  <a:txBody>
-                    <a:bodyPr/>
-                    <a:lstStyle/>
-                    <a:p>
-                      <a:r>
-                        <a:rPr lang="pt-BR" sz="900" dirty="0">
-                          <a:solidFill>
-                            <a:srgbClr val="FF0000"/>
-                          </a:solidFill>
-                          <a:latin typeface="Gotham HTF"/>
-                        </a:rPr>
-                        <a:t>Divulgação do CP2</a:t>
-                      </a:r>
-                    </a:p>
-                  </a:txBody>
-                  <a:tcPr/>
-                </a:tc>
-                <a:extLst>
-                  <a:ext uri="{0D108BD9-81ED-4DB2-BD59-A6C34878D82A}">
-                    <a16:rowId xmlns:a16="http://schemas.microsoft.com/office/drawing/2014/main" val="814908526"/>
-                  </a:ext>
-                </a:extLst>
-              </a:tr>
-              <a:tr h="333595">
-                <a:tc>
-                  <a:txBody>
-                    <a:bodyPr/>
-                    <a:lstStyle/>
-                    <a:p>
-                      <a:r>
-                        <a:rPr lang="pt-BR" sz="900" dirty="0">
-                          <a:solidFill>
-                            <a:schemeClr val="tx1"/>
-                          </a:solidFill>
-                          <a:latin typeface="Gotham HTF"/>
-                        </a:rPr>
-                        <a:t>09</a:t>
-                      </a:r>
-                    </a:p>
-                  </a:txBody>
-                  <a:tcPr/>
-                </a:tc>
-                <a:tc>
-                  <a:txBody>
-                    <a:bodyPr/>
-                    <a:lstStyle/>
-                    <a:p>
-                      <a:r>
-                        <a:rPr lang="pt-BR" sz="900" strike="noStrike" baseline="0" dirty="0">
-                          <a:solidFill>
-                            <a:schemeClr val="tx1"/>
-                          </a:solidFill>
-                          <a:latin typeface="Gotham HTF"/>
-                        </a:rPr>
-                        <a:t>Semana 9</a:t>
+                        <a:t>09 e 11 de Outubro</a:t>
                       </a:r>
                     </a:p>
                   </a:txBody>
@@ -8020,7 +8026,7 @@
                 </a:tc>
                 <a:extLst>
                   <a:ext uri="{0D108BD9-81ED-4DB2-BD59-A6C34878D82A}">
-                    <a16:rowId xmlns:a16="http://schemas.microsoft.com/office/drawing/2014/main" val="562429672"/>
+                    <a16:rowId xmlns:a16="http://schemas.microsoft.com/office/drawing/2014/main" val="814908526"/>
                   </a:ext>
                 </a:extLst>
               </a:tr>
@@ -8037,7 +8043,7 @@
                           </a:solidFill>
                           <a:latin typeface="Gotham HTF"/>
                         </a:rPr>
-                        <a:t>10</a:t>
+                        <a:t>09</a:t>
                       </a:r>
                     </a:p>
                   </a:txBody>
@@ -8049,13 +8055,13 @@
                     <a:lstStyle/>
                     <a:p>
                       <a:r>
-                        <a:rPr lang="pt-BR" sz="900" dirty="0">
+                        <a:rPr lang="pt-BR" sz="900" strike="noStrike" baseline="0" dirty="0">
                           <a:solidFill>
                             <a:schemeClr val="tx1"/>
                           </a:solidFill>
                           <a:latin typeface="Gotham HTF"/>
                         </a:rPr>
-                        <a:t>Semana 10</a:t>
+                        <a:t>16 e 18 de Outubro</a:t>
                       </a:r>
                     </a:p>
                   </a:txBody>
@@ -8092,6 +8098,114 @@
                         </a:rPr>
                         <a:t>Aula 09 - Padrões de Comunicação</a:t>
                       </a:r>
+                    </a:p>
+                  </a:txBody>
+                  <a:tcPr/>
+                </a:tc>
+                <a:tc>
+                  <a:txBody>
+                    <a:bodyPr/>
+                    <a:lstStyle/>
+                    <a:p>
+                      <a:endParaRPr lang="pt-BR" sz="900" dirty="0">
+                        <a:solidFill>
+                          <a:srgbClr val="FF0000"/>
+                        </a:solidFill>
+                        <a:latin typeface="Gotham HTF"/>
+                      </a:endParaRPr>
+                    </a:p>
+                  </a:txBody>
+                  <a:tcPr/>
+                </a:tc>
+                <a:extLst>
+                  <a:ext uri="{0D108BD9-81ED-4DB2-BD59-A6C34878D82A}">
+                    <a16:rowId xmlns:a16="http://schemas.microsoft.com/office/drawing/2014/main" val="562429672"/>
+                  </a:ext>
+                </a:extLst>
+              </a:tr>
+              <a:tr h="333595">
+                <a:tc>
+                  <a:txBody>
+                    <a:bodyPr/>
+                    <a:lstStyle/>
+                    <a:p>
+                      <a:r>
+                        <a:rPr lang="pt-BR" sz="900" dirty="0">
+                          <a:solidFill>
+                            <a:schemeClr val="tx1"/>
+                          </a:solidFill>
+                          <a:latin typeface="Gotham HTF"/>
+                        </a:rPr>
+                        <a:t>10</a:t>
+                      </a:r>
+                    </a:p>
+                  </a:txBody>
+                  <a:tcPr/>
+                </a:tc>
+                <a:tc>
+                  <a:txBody>
+                    <a:bodyPr/>
+                    <a:lstStyle/>
+                    <a:p>
+                      <a:r>
+                        <a:rPr lang="pt-BR" sz="900" dirty="0">
+                          <a:solidFill>
+                            <a:schemeClr val="tx1"/>
+                          </a:solidFill>
+                          <a:latin typeface="Gotham HTF"/>
+                        </a:rPr>
+                        <a:t>23 e 25 de Outubro</a:t>
+                      </a:r>
+                    </a:p>
+                  </a:txBody>
+                  <a:tcPr/>
+                </a:tc>
+                <a:tc>
+                  <a:txBody>
+                    <a:bodyPr/>
+                    <a:lstStyle/>
+                    <a:p>
+                      <a:pPr marL="0" marR="0" lvl="0" indent="0" algn="l" defTabSz="914400" rtl="0" eaLnBrk="1" fontAlgn="auto" latinLnBrk="0" hangingPunct="1">
+                        <a:lnSpc>
+                          <a:spcPct val="100000"/>
+                        </a:lnSpc>
+                        <a:spcBef>
+                          <a:spcPts val="0"/>
+                        </a:spcBef>
+                        <a:spcAft>
+                          <a:spcPts val="0"/>
+                        </a:spcAft>
+                        <a:buClrTx/>
+                        <a:buSzTx/>
+                        <a:buFontTx/>
+                        <a:buNone/>
+                        <a:tabLst/>
+                        <a:defRPr/>
+                      </a:pPr>
+                      <a:r>
+                        <a:rPr lang="pt-BR" sz="900" b="0" dirty="0">
+                          <a:solidFill>
+                            <a:schemeClr val="tx1"/>
+                          </a:solidFill>
+                          <a:latin typeface="Gotham HTF"/>
+                        </a:rPr>
+                        <a:t>Aula 10 – </a:t>
+                      </a:r>
+                      <a:r>
+                        <a:rPr lang="pt-BR" sz="900" dirty="0">
+                          <a:solidFill>
+                            <a:schemeClr val="tx1"/>
+                          </a:solidFill>
+                          <a:latin typeface="Gotham HTF"/>
+                        </a:rPr>
+                        <a:t>Tipos de Memória</a:t>
+                      </a:r>
+                      <a:endParaRPr lang="pt-BR" sz="900" b="0" dirty="0">
+                        <a:solidFill>
+                          <a:schemeClr val="tx1"/>
+                        </a:solidFill>
+                        <a:latin typeface="Gotham HTF"/>
+                      </a:endParaRPr>
                     </a:p>
                   </a:txBody>
                   <a:tcPr/>
@@ -8165,7 +8279,18 @@
                           </a:solidFill>
                           <a:latin typeface="Gotham HTF"/>
                         </a:rPr>
-                        <a:t>Semana 11</a:t>
+                        <a:t>30 de Outubro e </a:t>
+                      </a:r>
+                    </a:p>
+                    <a:p>
+                      <a:r>
+                        <a:rPr lang="pt-BR" sz="900" strike="noStrike" baseline="0" dirty="0">
+                          <a:solidFill>
+                            <a:schemeClr val="tx1"/>
+                          </a:solidFill>
+                          <a:latin typeface="Gotham HTF"/>
+                        </a:rPr>
+                        <a:t>01 de Novembro</a:t>
                       </a:r>
                     </a:p>
                   </a:txBody>
@@ -8176,30 +8301,32 @@
                     <a:bodyPr/>
                     <a:lstStyle/>
                     <a:p>
+                      <a:pPr marL="0" marR="0" lvl="0" indent="0" algn="l" defTabSz="914400" rtl="0" eaLnBrk="1" fontAlgn="auto" latinLnBrk="0" hangingPunct="1">
+                        <a:lnSpc>
+                          <a:spcPct val="100000"/>
+                        </a:lnSpc>
+                        <a:spcBef>
+                          <a:spcPts val="0"/>
+                        </a:spcBef>
+                        <a:spcAft>
+                          <a:spcPts val="0"/>
+                        </a:spcAft>
+                        <a:buClrTx/>
+                        <a:buSzTx/>
+                        <a:buFontTx/>
+                        <a:buNone/>
+                        <a:tabLst/>
+                        <a:defRPr/>
+                      </a:pPr>
                       <a:r>
-                        <a:rPr lang="pt-BR" sz="900" b="0" dirty="0">
+                        <a:rPr lang="pt-BR" sz="900" dirty="0">
                           <a:solidFill>
-                            <a:schemeClr val="tx1"/>
+                            <a:srgbClr val="FF0000"/>
                           </a:solidFill>
                           <a:latin typeface="Gotham HTF"/>
                         </a:rPr>
-                        <a:t>Aula 10 – </a:t>
+                        <a:t>Entrega CP2</a:t>
                       </a:r>
-                      <a:r>
-                        <a:rPr lang="pt-BR" sz="900" dirty="0">
-                          <a:solidFill>
-                            <a:schemeClr val="tx1"/>
-                          </a:solidFill>
-                          <a:latin typeface="Gotham HTF"/>
-                        </a:rPr>
-                        <a:t>Tipos de Memória</a:t>
-                      </a:r>
-                      <a:endParaRPr lang="pt-BR" sz="900" b="0" dirty="0">
-                        <a:solidFill>
-                          <a:schemeClr val="tx1"/>
-                        </a:solidFill>
-                        <a:latin typeface="Gotham HTF"/>
-                      </a:endParaRPr>
                     </a:p>
                   </a:txBody>
                   <a:tcPr/>
@@ -8209,12 +8336,32 @@
                     <a:bodyPr/>
                     <a:lstStyle/>
                     <a:p>
-                      <a:endParaRPr lang="pt-BR" sz="900" dirty="0">
-                        <a:solidFill>
-                          <a:schemeClr val="tx1"/>
-                        </a:solidFill>
-                        <a:latin typeface="Gotham HTF"/>
-                      </a:endParaRPr>
+                      <a:pPr marL="0" marR="0" lvl="0" indent="0" algn="l" defTabSz="914400" rtl="0" eaLnBrk="1" fontAlgn="auto" latinLnBrk="0" hangingPunct="1">
+                        <a:lnSpc>
+                          <a:spcPct val="100000"/>
+                        </a:lnSpc>
+                        <a:spcBef>
+                          <a:spcPts val="0"/>
+                        </a:spcBef>
+                        <a:spcAft>
+                          <a:spcPts val="0"/>
+                        </a:spcAft>
+                        <a:buClrTx/>
+                        <a:buSzTx/>
+                        <a:buFontTx/>
+                        <a:buNone/>
+                        <a:tabLst/>
+                        <a:defRPr/>
+                      </a:pPr>
+                      <a:r>
+                        <a:rPr lang="pt-BR" sz="900" dirty="0">
+                          <a:solidFill>
+                            <a:srgbClr val="FF0000"/>
+                          </a:solidFill>
+                          <a:latin typeface="Gotham HTF"/>
+                        </a:rPr>
+                        <a:t>Divulgação do CP3</a:t>
+                      </a:r>
                     </a:p>
                   </a:txBody>
                   <a:tcPr/>
@@ -8256,7 +8403,7 @@
                           </a:solidFill>
                           <a:latin typeface="Gotham HTF"/>
                         </a:rPr>
-                        <a:t>Semana 12</a:t>
+                        <a:t>06 e 08 de Novembro</a:t>
                       </a:r>
                     </a:p>
                   </a:txBody>
@@ -8267,33 +8414,35 @@
                     <a:bodyPr/>
                     <a:lstStyle/>
                     <a:p>
+                      <a:pPr marL="0" marR="0" lvl="0" indent="0" algn="l" defTabSz="914400" rtl="0" eaLnBrk="1" fontAlgn="auto" latinLnBrk="0" hangingPunct="1">
+                        <a:lnSpc>
+                          <a:spcPct val="100000"/>
+                        </a:lnSpc>
+                        <a:spcBef>
+                          <a:spcPts val="0"/>
+                        </a:spcBef>
+                        <a:spcAft>
+                          <a:spcPts val="0"/>
+                        </a:spcAft>
+                        <a:buClrTx/>
+                        <a:buSzTx/>
+                        <a:buFontTx/>
+                        <a:buNone/>
+                        <a:tabLst/>
+                        <a:defRPr/>
+                      </a:pPr>
                       <a:r>
                         <a:rPr lang="pt-BR" sz="900" dirty="0">
                           <a:solidFill>
-                            <a:schemeClr val="tx1"/>
+                            <a:srgbClr val="FF0000"/>
                           </a:solidFill>
                           <a:latin typeface="Gotham HTF"/>
                         </a:rPr>
-                        <a:t>Aula 11 - </a:t>
+                        <a:t>Entrega CP3</a:t>
                       </a:r>
-                      <a:r>
-                        <a:rPr lang="pt-BR" sz="900" dirty="0" err="1">
-                          <a:solidFill>
-                            <a:schemeClr val="tx1"/>
-                          </a:solidFill>
-                          <a:latin typeface="Gotham HTF"/>
-                        </a:rPr>
-                        <a:t>Bootloader</a:t>
-                      </a:r>
-                      <a:r>
-                        <a:rPr lang="pt-BR" sz="900" dirty="0">
-                          <a:solidFill>
-                            <a:schemeClr val="tx1"/>
-                          </a:solidFill>
-                          <a:latin typeface="Gotham HTF"/>
-                        </a:rPr>
-                        <a:t> e Interrupções</a:t>
-                      </a:r>
+                      <a:endParaRPr lang="pt-BR" sz="900" dirty="0">
+                        <a:latin typeface="Gotham HTF"/>
+                      </a:endParaRPr>
                     </a:p>
                   </a:txBody>
                   <a:tcPr/>
@@ -8350,7 +8499,7 @@
                           </a:solidFill>
                           <a:latin typeface="Gotham HTF"/>
                         </a:rPr>
-                        <a:t>Semana 13</a:t>
+                        <a:t>13 de Novembro</a:t>
                       </a:r>
                     </a:p>
                   </a:txBody>
@@ -8368,7 +8517,7 @@
                           </a:solidFill>
                           <a:latin typeface="Gotham HTF"/>
                         </a:rPr>
-                        <a:t>Entrega CP2</a:t>
+                        <a:t>KICK OFF da GS</a:t>
                       </a:r>
                       <a:endParaRPr lang="pt-BR" sz="900" dirty="0">
                         <a:solidFill>
@@ -8402,15 +8551,12 @@
                         <a:tabLst/>
                         <a:defRPr/>
                       </a:pPr>
-                      <a:r>
-                        <a:rPr lang="pt-BR" sz="900" dirty="0">
-                          <a:solidFill>
-                            <a:srgbClr val="FF0000"/>
-                          </a:solidFill>
-                          <a:latin typeface="Gotham HTF"/>
-                        </a:rPr>
-                        <a:t>Divulgação do CP3</a:t>
-                      </a:r>
+                      <a:endParaRPr lang="pt-BR" sz="900" dirty="0">
+                        <a:solidFill>
+                          <a:srgbClr val="FF0000"/>
+                        </a:solidFill>
+                        <a:latin typeface="Gotham HTF"/>
+                      </a:endParaRPr>
                     </a:p>
                   </a:txBody>
                   <a:tcPr/>
@@ -8445,15 +8591,12 @@
                     <a:bodyPr/>
                     <a:lstStyle/>
                     <a:p>
-                      <a:r>
-                        <a:rPr lang="pt-BR" sz="900" dirty="0">
-                          <a:solidFill>
-                            <a:schemeClr val="tx1"/>
-                          </a:solidFill>
-                          <a:latin typeface="Gotham HTF"/>
-                        </a:rPr>
-                        <a:t>Semana 14</a:t>
-                      </a:r>
+                      <a:endParaRPr lang="pt-BR" sz="900" dirty="0">
+                        <a:solidFill>
+                          <a:schemeClr val="tx1"/>
+                        </a:solidFill>
+                        <a:latin typeface="Gotham HTF"/>
+                      </a:endParaRPr>
                     </a:p>
                   </a:txBody>
                   <a:tcPr/>
@@ -8480,24 +8623,6 @@
                         <a:tabLst/>
                         <a:defRPr/>
                       </a:pPr>
-                      <a:r>
-                        <a:rPr lang="pt-BR" sz="900" dirty="0">
-                          <a:solidFill>
-                            <a:schemeClr val="tx1"/>
-                          </a:solidFill>
-                          <a:latin typeface="Gotham HTF"/>
-                        </a:rPr>
-                        <a:t>Aula 12 –  Dúvidas sobre </a:t>
-                      </a:r>
-                      <a:r>
-                        <a:rPr lang="pt-BR" sz="900" dirty="0" err="1">
-                          <a:solidFill>
-                            <a:schemeClr val="tx1"/>
-                          </a:solidFill>
-                          <a:latin typeface="Gotham HTF"/>
-                        </a:rPr>
-                        <a:t>Challenge</a:t>
-                      </a:r>
                       <a:endParaRPr lang="pt-BR" sz="900" dirty="0">
                         <a:solidFill>
                           <a:srgbClr val="FF0000"/>
@@ -8530,15 +8655,6 @@
                         <a:tabLst/>
                         <a:defRPr/>
                       </a:pPr>
-                      <a:r>
-                        <a:rPr lang="pt-BR" sz="900" dirty="0">
-                          <a:solidFill>
-                            <a:srgbClr val="FF0000"/>
-                          </a:solidFill>
-                          <a:latin typeface="Gotham HTF"/>
-                        </a:rPr>
-                        <a:t>Entrega CP3</a:t>
-                      </a:r>
                       <a:endParaRPr lang="pt-BR" sz="900" dirty="0">
                         <a:latin typeface="Gotham HTF"/>
                       </a:endParaRPr>

</xml_diff>

<commit_message>
feat: Atualização do conteúdo de aula dado em 2023 para as turmas de fev e ago.
</commit_message>
<xml_diff>
--- a/1º Semestre/Aula 00 - Aula Magna e Orientações/Aula 00 - Aula Magna e Orientações v2.pptx
+++ b/1º Semestre/Aula 00 - Aula Magna e Orientações/Aula 00 - Aula Magna e Orientações v2.pptx
@@ -223,7 +223,7 @@
             <a:fld id="{4EA5E1ED-E65E-440E-8A4B-5F5DC973F797}" type="datetimeFigureOut">
               <a:rPr lang="pt-BR" smtClean="0"/>
               <a:pPr/>
-              <a:t>27/08/2023</a:t>
+              <a:t>01/10/2023</a:t>
             </a:fld>
             <a:endParaRPr lang="pt-BR"/>
           </a:p>
@@ -640,7 +640,7 @@
           <a:p>
             <a:fld id="{1787AD07-0C2A-424C-83EF-FCCF4A0D3BA0}" type="datetime1">
               <a:rPr lang="pt-BR" smtClean="0"/>
-              <a:t>27/08/2023</a:t>
+              <a:t>01/10/2023</a:t>
             </a:fld>
             <a:endParaRPr lang="pt-BR"/>
           </a:p>
@@ -809,7 +809,7 @@
           <a:p>
             <a:fld id="{2F92FB66-59C8-46A5-AD82-5DAAFD2DC390}" type="datetime1">
               <a:rPr lang="pt-BR" smtClean="0"/>
-              <a:t>27/08/2023</a:t>
+              <a:t>01/10/2023</a:t>
             </a:fld>
             <a:endParaRPr lang="pt-BR"/>
           </a:p>
@@ -988,7 +988,7 @@
           <a:p>
             <a:fld id="{3D5CC8D2-C61E-4471-AD68-1C0D45A8EAFC}" type="datetime1">
               <a:rPr lang="pt-BR" smtClean="0"/>
-              <a:t>27/08/2023</a:t>
+              <a:t>01/10/2023</a:t>
             </a:fld>
             <a:endParaRPr lang="pt-BR"/>
           </a:p>
@@ -1131,7 +1131,7 @@
           <a:p>
             <a:fld id="{C3E38981-C08A-4A29-B885-392FB4EE0709}" type="datetime1">
               <a:rPr lang="pt-BR" smtClean="0"/>
-              <a:t>27/08/2023</a:t>
+              <a:t>01/10/2023</a:t>
             </a:fld>
             <a:endParaRPr lang="en-US" dirty="0"/>
           </a:p>
@@ -1516,7 +1516,7 @@
           <a:p>
             <a:fld id="{2CFE63D7-5B4A-40A4-8FD4-EA63D1010EB7}" type="datetime1">
               <a:rPr lang="pt-BR" smtClean="0"/>
-              <a:t>27/08/2023</a:t>
+              <a:t>01/10/2023</a:t>
             </a:fld>
             <a:endParaRPr lang="en-US" dirty="0"/>
           </a:p>
@@ -1738,7 +1738,7 @@
           <a:p>
             <a:fld id="{A9719147-5557-4D76-A2C3-BF25882771D2}" type="datetime1">
               <a:rPr lang="pt-BR" smtClean="0"/>
-              <a:t>27/08/2023</a:t>
+              <a:t>01/10/2023</a:t>
             </a:fld>
             <a:endParaRPr lang="en-US" dirty="0"/>
           </a:p>
@@ -2051,7 +2051,7 @@
           <a:p>
             <a:fld id="{66250340-7104-44A8-88A9-88532CCE9C1C}" type="datetime1">
               <a:rPr lang="pt-BR" smtClean="0"/>
-              <a:t>27/08/2023</a:t>
+              <a:t>01/10/2023</a:t>
             </a:fld>
             <a:endParaRPr lang="en-US" dirty="0"/>
           </a:p>
@@ -2236,7 +2236,7 @@
           <a:p>
             <a:fld id="{D047EA32-7810-48BE-A9BB-EA3D8AA5AD34}" type="datetime1">
               <a:rPr lang="pt-BR" smtClean="0"/>
-              <a:t>27/08/2023</a:t>
+              <a:t>01/10/2023</a:t>
             </a:fld>
             <a:endParaRPr lang="en-US" dirty="0"/>
           </a:p>
@@ -2384,7 +2384,7 @@
           <a:p>
             <a:fld id="{7C28E9E9-B91F-400E-BE43-87BB4B5C6F4E}" type="datetime1">
               <a:rPr lang="pt-BR" smtClean="0"/>
-              <a:t>27/08/2023</a:t>
+              <a:t>01/10/2023</a:t>
             </a:fld>
             <a:endParaRPr lang="en-US" dirty="0"/>
           </a:p>
@@ -2636,7 +2636,7 @@
           <a:p>
             <a:fld id="{A9E773EA-BFD5-41D4-8CCD-2C9F67DAB481}" type="datetime1">
               <a:rPr lang="pt-BR" smtClean="0"/>
-              <a:t>27/08/2023</a:t>
+              <a:t>01/10/2023</a:t>
             </a:fld>
             <a:endParaRPr lang="pt-BR" dirty="0"/>
           </a:p>
@@ -2838,7 +2838,7 @@
           <a:p>
             <a:fld id="{DAA7C8B6-CF57-4A95-AF6C-A77E6C230ED3}" type="datetime1">
               <a:rPr lang="pt-BR" smtClean="0"/>
-              <a:t>27/08/2023</a:t>
+              <a:t>01/10/2023</a:t>
             </a:fld>
             <a:endParaRPr lang="pt-BR"/>
           </a:p>
@@ -3122,7 +3122,7 @@
           <a:p>
             <a:fld id="{34D50989-24C8-4023-9B0D-A6D249548FD9}" type="datetime1">
               <a:rPr lang="pt-BR" smtClean="0"/>
-              <a:t>27/08/2023</a:t>
+              <a:t>01/10/2023</a:t>
             </a:fld>
             <a:endParaRPr lang="pt-BR"/>
           </a:p>
@@ -3358,7 +3358,7 @@
           <a:p>
             <a:fld id="{8D9BC96A-9776-4585-A439-BC9E2DA226C1}" type="datetime1">
               <a:rPr lang="pt-BR" smtClean="0"/>
-              <a:t>27/08/2023</a:t>
+              <a:t>01/10/2023</a:t>
             </a:fld>
             <a:endParaRPr lang="pt-BR"/>
           </a:p>
@@ -3741,7 +3741,7 @@
           <a:p>
             <a:fld id="{7D12BE36-2922-4567-BD67-201EFA21BF6D}" type="datetime1">
               <a:rPr lang="pt-BR" smtClean="0"/>
-              <a:t>27/08/2023</a:t>
+              <a:t>01/10/2023</a:t>
             </a:fld>
             <a:endParaRPr lang="pt-BR"/>
           </a:p>
@@ -3853,7 +3853,7 @@
           <a:p>
             <a:fld id="{E5B462A9-4B1E-4013-BFB1-FC92225AC2F2}" type="datetime1">
               <a:rPr lang="pt-BR" smtClean="0"/>
-              <a:t>27/08/2023</a:t>
+              <a:t>01/10/2023</a:t>
             </a:fld>
             <a:endParaRPr lang="pt-BR"/>
           </a:p>
@@ -3937,7 +3937,7 @@
           <a:p>
             <a:fld id="{D0E6EC7A-67E7-4978-9BAE-C8F82A40B13B}" type="datetime1">
               <a:rPr lang="pt-BR" smtClean="0"/>
-              <a:t>27/08/2023</a:t>
+              <a:t>01/10/2023</a:t>
             </a:fld>
             <a:endParaRPr lang="pt-BR"/>
           </a:p>
@@ -4219,7 +4219,7 @@
           <a:p>
             <a:fld id="{6E085A4E-80B8-47DD-9D9B-8E1B205CBB30}" type="datetime1">
               <a:rPr lang="pt-BR" smtClean="0"/>
-              <a:t>27/08/2023</a:t>
+              <a:t>01/10/2023</a:t>
             </a:fld>
             <a:endParaRPr lang="pt-BR"/>
           </a:p>
@@ -4478,7 +4478,7 @@
           <a:p>
             <a:fld id="{F4E9A02C-D9AD-4B8C-9B93-B0980E8E86EB}" type="datetime1">
               <a:rPr lang="pt-BR" smtClean="0"/>
-              <a:t>27/08/2023</a:t>
+              <a:t>01/10/2023</a:t>
             </a:fld>
             <a:endParaRPr lang="pt-BR"/>
           </a:p>
@@ -4690,7 +4690,7 @@
           <a:p>
             <a:fld id="{202762D0-3A59-4B14-83BA-8E0FC8A60AB1}" type="datetime1">
               <a:rPr lang="pt-BR" smtClean="0"/>
-              <a:t>27/08/2023</a:t>
+              <a:t>01/10/2023</a:t>
             </a:fld>
             <a:endParaRPr lang="pt-BR"/>
           </a:p>
@@ -7076,14 +7076,14 @@
           <p:nvPr>
             <p:extLst>
               <p:ext uri="{D42A27DB-BD31-4B8C-83A1-F6EECF244321}">
-                <p14:modId xmlns:p14="http://schemas.microsoft.com/office/powerpoint/2010/main" val="2110600779"/>
+                <p14:modId xmlns:p14="http://schemas.microsoft.com/office/powerpoint/2010/main" val="836859706"/>
               </p:ext>
             </p:extLst>
           </p:nvPr>
         </p:nvGraphicFramePr>
         <p:xfrm>
           <a:off x="323528" y="1089371"/>
-          <a:ext cx="8234893" cy="5068255"/>
+          <a:ext cx="8234893" cy="5229080"/>
         </p:xfrm>
         <a:graphic>
           <a:graphicData uri="http://schemas.openxmlformats.org/drawingml/2006/table">
@@ -7299,7 +7299,7 @@
                         <a:rPr lang="pt-BR" sz="900" dirty="0">
                           <a:latin typeface="Gotham HTF"/>
                         </a:rPr>
-                        <a:t>Parcial OK</a:t>
+                        <a:t>OK</a:t>
                       </a:r>
                     </a:p>
                   </a:txBody>
@@ -7390,6 +7390,17 @@
                           <a:latin typeface="Gotham HTF"/>
                         </a:rPr>
                         <a:t>Divulgação do CP1</a:t>
+                      </a:r>
+                    </a:p>
+                    <a:p>
+                      <a:r>
+                        <a:rPr lang="pt-BR" sz="900" dirty="0">
+                          <a:solidFill>
+                            <a:srgbClr val="FF0000"/>
+                          </a:solidFill>
+                          <a:latin typeface="Gotham HTF"/>
+                        </a:rPr>
+                        <a:t>OK</a:t>
                       </a:r>
                     </a:p>
                   </a:txBody>
@@ -7489,12 +7500,15 @@
                         <a:tabLst/>
                         <a:defRPr/>
                       </a:pPr>
-                      <a:endParaRPr lang="pt-BR" sz="900" dirty="0">
-                        <a:solidFill>
-                          <a:srgbClr val="FF0000"/>
-                        </a:solidFill>
-                        <a:latin typeface="Gotham HTF"/>
-                      </a:endParaRPr>
+                      <a:r>
+                        <a:rPr lang="pt-BR" sz="900" dirty="0">
+                          <a:solidFill>
+                            <a:srgbClr val="FF0000"/>
+                          </a:solidFill>
+                          <a:latin typeface="Gotham HTF"/>
+                        </a:rPr>
+                        <a:t>OK</a:t>
+                      </a:r>
                     </a:p>
                   </a:txBody>
                   <a:tcPr/>
@@ -7593,12 +7607,15 @@
                         <a:tabLst/>
                         <a:defRPr/>
                       </a:pPr>
-                      <a:endParaRPr lang="pt-BR" sz="900" dirty="0">
-                        <a:solidFill>
-                          <a:srgbClr val="FF0000"/>
-                        </a:solidFill>
-                        <a:latin typeface="Gotham HTF"/>
-                      </a:endParaRPr>
+                      <a:r>
+                        <a:rPr lang="pt-BR" sz="900" dirty="0">
+                          <a:solidFill>
+                            <a:srgbClr val="FF0000"/>
+                          </a:solidFill>
+                          <a:latin typeface="Gotham HTF"/>
+                        </a:rPr>
+                        <a:t>OK</a:t>
+                      </a:r>
                     </a:p>
                   </a:txBody>
                   <a:tcPr/>
@@ -7680,9 +7697,12 @@
                     <a:bodyPr/>
                     <a:lstStyle/>
                     <a:p>
-                      <a:endParaRPr lang="pt-BR" sz="900" dirty="0">
-                        <a:latin typeface="Gotham HTF"/>
-                      </a:endParaRPr>
+                      <a:r>
+                        <a:rPr lang="pt-BR" sz="900" dirty="0">
+                          <a:latin typeface="Gotham HTF"/>
+                        </a:rPr>
+                        <a:t>Parcial OK</a:t>
+                      </a:r>
                     </a:p>
                   </a:txBody>
                   <a:tcPr/>
@@ -7784,12 +7804,15 @@
                         <a:tabLst/>
                         <a:defRPr/>
                       </a:pPr>
-                      <a:endParaRPr lang="pt-BR" sz="900" dirty="0">
-                        <a:solidFill>
-                          <a:srgbClr val="FF0000"/>
-                        </a:solidFill>
-                        <a:latin typeface="Gotham HTF"/>
-                      </a:endParaRPr>
+                      <a:r>
+                        <a:rPr lang="pt-BR" sz="900" dirty="0">
+                          <a:solidFill>
+                            <a:srgbClr val="FF0000"/>
+                          </a:solidFill>
+                          <a:latin typeface="Gotham HTF"/>
+                        </a:rPr>
+                        <a:t>OK</a:t>
+                      </a:r>
                     </a:p>
                   </a:txBody>
                   <a:tcPr/>
@@ -7858,6 +7881,31 @@
                       </a:pPr>
                       <a:r>
                         <a:rPr lang="pt-BR" sz="900" dirty="0">
+                          <a:latin typeface="Gotham HTF"/>
+                        </a:rPr>
+                        <a:t>Aula 06 – Funções e Sensores de Ambiente</a:t>
+                      </a:r>
+                    </a:p>
+                    <a:p>
+                      <a:pPr marL="0" marR="0" lvl="0" indent="0" algn="l" defTabSz="914400" rtl="0" eaLnBrk="1" fontAlgn="auto" latinLnBrk="0" hangingPunct="1">
+                        <a:lnSpc>
+                          <a:spcPct val="100000"/>
+                        </a:lnSpc>
+                        <a:spcBef>
+                          <a:spcPts val="0"/>
+                        </a:spcBef>
+                        <a:spcAft>
+                          <a:spcPts val="0"/>
+                        </a:spcAft>
+                        <a:buClrTx/>
+                        <a:buSzTx/>
+                        <a:buFontTx/>
+                        <a:buNone/>
+                        <a:tabLst/>
+                        <a:defRPr/>
+                      </a:pPr>
+                      <a:r>
+                        <a:rPr lang="pt-BR" sz="900" strike="sngStrike" dirty="0">
                           <a:latin typeface="Gotham HTF"/>
                         </a:rPr>
                         <a:t>Aula 07 – Atuadores </a:t>
@@ -7965,6 +8013,37 @@
                       </a:pPr>
                       <a:r>
                         <a:rPr lang="pt-BR" sz="900" dirty="0">
+                          <a:latin typeface="Gotham HTF"/>
+                        </a:rPr>
+                        <a:t>Aula 07 – Atuadores </a:t>
+                      </a:r>
+                      <a:endParaRPr lang="pt-BR" sz="900" dirty="0">
+                        <a:solidFill>
+                          <a:schemeClr val="tx1"/>
+                        </a:solidFill>
+                        <a:latin typeface="Gotham HTF"/>
+                      </a:endParaRPr>
+                    </a:p>
+                    <a:p>
+                      <a:pPr marL="0" marR="0" lvl="0" indent="0" algn="l" defTabSz="914400" rtl="0" eaLnBrk="1" fontAlgn="auto" latinLnBrk="0" hangingPunct="1">
+                        <a:lnSpc>
+                          <a:spcPct val="100000"/>
+                        </a:lnSpc>
+                        <a:spcBef>
+                          <a:spcPts val="0"/>
+                        </a:spcBef>
+                        <a:spcAft>
+                          <a:spcPts val="0"/>
+                        </a:spcAft>
+                        <a:buClrTx/>
+                        <a:buSzTx/>
+                        <a:buFontTx/>
+                        <a:buNone/>
+                        <a:tabLst/>
+                        <a:defRPr/>
+                      </a:pPr>
+                      <a:r>
+                        <a:rPr lang="pt-BR" sz="900" strike="sngStrike" dirty="0">
                           <a:solidFill>
                             <a:schemeClr val="tx1"/>
                           </a:solidFill>
@@ -7973,7 +8052,7 @@
                         <a:t>Aula 08 - Sistema de </a:t>
                       </a:r>
                       <a:r>
-                        <a:rPr lang="pt-BR" sz="900" dirty="0" err="1">
+                        <a:rPr lang="pt-BR" sz="900" strike="sngStrike" dirty="0" err="1">
                           <a:solidFill>
                             <a:schemeClr val="tx1"/>
                           </a:solidFill>
@@ -7982,7 +8061,7 @@
                         <a:t>Clock</a:t>
                       </a:r>
                       <a:r>
-                        <a:rPr lang="pt-BR" sz="900" dirty="0">
+                        <a:rPr lang="pt-BR" sz="900" strike="sngStrike" dirty="0">
                           <a:solidFill>
                             <a:schemeClr val="tx1"/>
                           </a:solidFill>
@@ -7991,7 +8070,7 @@
                         <a:t>, RTC e </a:t>
                       </a:r>
                       <a:r>
-                        <a:rPr lang="pt-BR" sz="900" dirty="0" err="1">
+                        <a:rPr lang="pt-BR" sz="900" strike="sngStrike" dirty="0" err="1">
                           <a:solidFill>
                             <a:schemeClr val="tx1"/>
                           </a:solidFill>
@@ -7999,7 +8078,7 @@
                         </a:rPr>
                         <a:t>Watchdog</a:t>
                       </a:r>
-                      <a:endParaRPr lang="pt-BR" sz="900" dirty="0">
+                      <a:endParaRPr lang="pt-BR" sz="900" strike="sngStrike" dirty="0">
                         <a:solidFill>
                           <a:schemeClr val="tx1"/>
                         </a:solidFill>
@@ -8091,6 +8170,37 @@
                       </a:pPr>
                       <a:r>
                         <a:rPr lang="pt-BR" sz="900" dirty="0">
+                          <a:latin typeface="Gotham HTF"/>
+                        </a:rPr>
+                        <a:t>Aula 07 – Atuadores </a:t>
+                      </a:r>
+                      <a:endParaRPr lang="pt-BR" sz="900" dirty="0">
+                        <a:solidFill>
+                          <a:schemeClr val="tx1"/>
+                        </a:solidFill>
+                        <a:latin typeface="Gotham HTF"/>
+                      </a:endParaRPr>
+                    </a:p>
+                    <a:p>
+                      <a:pPr marL="0" marR="0" lvl="0" indent="0" algn="l" defTabSz="914400" rtl="0" eaLnBrk="1" fontAlgn="auto" latinLnBrk="0" hangingPunct="1">
+                        <a:lnSpc>
+                          <a:spcPct val="100000"/>
+                        </a:lnSpc>
+                        <a:spcBef>
+                          <a:spcPts val="0"/>
+                        </a:spcBef>
+                        <a:spcAft>
+                          <a:spcPts val="0"/>
+                        </a:spcAft>
+                        <a:buClrTx/>
+                        <a:buSzTx/>
+                        <a:buFontTx/>
+                        <a:buNone/>
+                        <a:tabLst/>
+                        <a:defRPr/>
+                      </a:pPr>
+                      <a:r>
+                        <a:rPr lang="pt-BR" sz="900" strike="sngStrike" dirty="0">
                           <a:solidFill>
                             <a:schemeClr val="tx1"/>
                           </a:solidFill>
@@ -8183,7 +8293,7 @@
                         <a:defRPr/>
                       </a:pPr>
                       <a:r>
-                        <a:rPr lang="pt-BR" sz="900" b="0" dirty="0">
+                        <a:rPr lang="pt-BR" sz="900" b="0" strike="sngStrike" dirty="0">
                           <a:solidFill>
                             <a:schemeClr val="tx1"/>
                           </a:solidFill>
@@ -8192,7 +8302,7 @@
                         <a:t>Aula 10 – </a:t>
                       </a:r>
                       <a:r>
-                        <a:rPr lang="pt-BR" sz="900" dirty="0">
+                        <a:rPr lang="pt-BR" sz="900" strike="sngStrike" dirty="0">
                           <a:solidFill>
                             <a:schemeClr val="tx1"/>
                           </a:solidFill>
@@ -8200,12 +8310,34 @@
                         </a:rPr>
                         <a:t>Tipos de Memória</a:t>
                       </a:r>
-                      <a:endParaRPr lang="pt-BR" sz="900" b="0" dirty="0">
-                        <a:solidFill>
-                          <a:schemeClr val="tx1"/>
-                        </a:solidFill>
-                        <a:latin typeface="Gotham HTF"/>
-                      </a:endParaRPr>
+                    </a:p>
+                    <a:p>
+                      <a:pPr marL="0" marR="0" lvl="0" indent="0" algn="l" defTabSz="914400" rtl="0" eaLnBrk="1" fontAlgn="auto" latinLnBrk="0" hangingPunct="1">
+                        <a:lnSpc>
+                          <a:spcPct val="100000"/>
+                        </a:lnSpc>
+                        <a:spcBef>
+                          <a:spcPts val="0"/>
+                        </a:spcBef>
+                        <a:spcAft>
+                          <a:spcPts val="0"/>
+                        </a:spcAft>
+                        <a:buClrTx/>
+                        <a:buSzTx/>
+                        <a:buFontTx/>
+                        <a:buNone/>
+                        <a:tabLst/>
+                        <a:defRPr/>
+                      </a:pPr>
+                      <a:r>
+                        <a:rPr lang="pt-BR" sz="900" b="0" strike="noStrike" dirty="0">
+                          <a:solidFill>
+                            <a:schemeClr val="tx1"/>
+                          </a:solidFill>
+                          <a:latin typeface="Gotham HTF"/>
+                        </a:rPr>
+                        <a:t>Projetos</a:t>
+                      </a:r>
                     </a:p>
                   </a:txBody>
                   <a:tcPr/>

</xml_diff>